<commit_message>
SLides for week 8
</commit_message>
<xml_diff>
--- a/assignments/siddique/week-08-presentation/Delete Forensics.pptx
+++ b/assignments/siddique/week-08-presentation/Delete Forensics.pptx
@@ -5,7 +5,7 @@
     <p:sldMasterId id="2147483960" r:id="rId1"/>
   </p:sldMasterIdLst>
   <p:notesMasterIdLst>
-    <p:notesMasterId r:id="rId43"/>
+    <p:notesMasterId r:id="rId44"/>
   </p:notesMasterIdLst>
   <p:sldIdLst>
     <p:sldId id="256" r:id="rId2"/>
@@ -44,11 +44,12 @@
     <p:sldId id="368" r:id="rId35"/>
     <p:sldId id="378" r:id="rId36"/>
     <p:sldId id="383" r:id="rId37"/>
-    <p:sldId id="384" r:id="rId38"/>
-    <p:sldId id="385" r:id="rId39"/>
-    <p:sldId id="386" r:id="rId40"/>
-    <p:sldId id="387" r:id="rId41"/>
-    <p:sldId id="369" r:id="rId42"/>
+    <p:sldId id="390" r:id="rId38"/>
+    <p:sldId id="384" r:id="rId39"/>
+    <p:sldId id="385" r:id="rId40"/>
+    <p:sldId id="386" r:id="rId41"/>
+    <p:sldId id="387" r:id="rId42"/>
+    <p:sldId id="369" r:id="rId43"/>
   </p:sldIdLst>
   <p:sldSz cx="9144000" cy="6858000" type="screen4x3"/>
   <p:notesSz cx="6858000" cy="9144000"/>
@@ -3922,11 +3923,7 @@
             <a:pPr algn="ctr"/>
             <a:r>
               <a:rPr lang="en-US" sz="3200" dirty="0" smtClean="0"/>
-              <a:t>Blog Written </a:t>
-            </a:r>
-            <a:r>
-              <a:rPr lang="en-US" sz="3200" dirty="0" smtClean="0"/>
-              <a:t>by</a:t>
+              <a:t>Blog Written by</a:t>
             </a:r>
             <a:endParaRPr lang="en-US" sz="3200" dirty="0"/>
           </a:p>
@@ -4132,11 +4129,7 @@
           <a:p>
             <a:r>
               <a:rPr lang="en-US" sz="3200" dirty="0" smtClean="0"/>
-              <a:t>Steps to finding deleted tweets </a:t>
-            </a:r>
-            <a:r>
-              <a:rPr lang="en-US" sz="3200" dirty="0" smtClean="0"/>
-              <a:t>using Twarc</a:t>
+              <a:t>Steps to finding deleted tweets using Twarc</a:t>
             </a:r>
             <a:endParaRPr lang="en-US" sz="3200" dirty="0"/>
           </a:p>
@@ -5734,7 +5727,7 @@
             <a:r>
               <a:rPr lang="en-US" b="1" dirty="0">
                 <a:solidFill>
-                  <a:srgbClr val="7030A0"/>
+                  <a:srgbClr val="FF0000"/>
                 </a:solidFill>
                 <a:latin typeface="Courier New" pitchFamily="49" charset="0"/>
                 <a:cs typeface="Courier New" pitchFamily="49" charset="0"/>
@@ -5748,9 +5741,6 @@
             </a:pPr>
             <a:r>
               <a:rPr lang="en-US" dirty="0">
-                <a:solidFill>
-                  <a:srgbClr val="7030A0"/>
-                </a:solidFill>
                 <a:latin typeface="Courier New" pitchFamily="49" charset="0"/>
                 <a:cs typeface="Courier New" pitchFamily="49" charset="0"/>
               </a:rPr>
@@ -5932,7 +5922,6 @@
               <a:rPr lang="en-US" dirty="0"/>
               <a:t>USER_PROTECTED</a:t>
             </a:r>
-            <a:endParaRPr lang="en-US" dirty="0"/>
           </a:p>
         </p:txBody>
       </p:sp>
@@ -7126,7 +7115,19 @@
           <a:p>
             <a:r>
               <a:rPr lang="en-US" dirty="0"/>
-              <a:t>A deleted tweet implies that a user has decided to delete their tweet.</a:t>
+              <a:t>A </a:t>
+            </a:r>
+            <a:r>
+              <a:rPr lang="en-US" dirty="0" smtClean="0"/>
+              <a:t>tweet missing from the live web is referred </a:t>
+            </a:r>
+            <a:r>
+              <a:rPr lang="en-US" smtClean="0"/>
+              <a:t>as a deleted </a:t>
+            </a:r>
+            <a:r>
+              <a:rPr lang="en-US" dirty="0" smtClean="0"/>
+              <a:t>tweet.</a:t>
             </a:r>
             <a:endParaRPr lang="en-US" dirty="0"/>
           </a:p>
@@ -7889,11 +7890,7 @@
           <a:p>
             <a:r>
               <a:rPr lang="en-US" sz="3200" dirty="0" smtClean="0"/>
-              <a:t>Memento of </a:t>
-            </a:r>
-            <a:r>
-              <a:rPr lang="en-US" sz="3200" dirty="0" smtClean="0"/>
-              <a:t>retweet from @Omarosa45</a:t>
+              <a:t>Memento of retweet from @Omarosa45</a:t>
             </a:r>
             <a:endParaRPr lang="en-US" sz="3200" dirty="0"/>
           </a:p>
@@ -8632,9 +8629,6 @@
             </a:pPr>
             <a:r>
               <a:rPr lang="en-US" dirty="0">
-                <a:solidFill>
-                  <a:srgbClr val="FF0000"/>
-                </a:solidFill>
                 <a:latin typeface="Courier New" pitchFamily="49" charset="0"/>
                 <a:cs typeface="Courier New" pitchFamily="49" charset="0"/>
               </a:rPr>
@@ -10207,14 +10201,7 @@
                 <a:latin typeface="Courier New" pitchFamily="49" charset="0"/>
                 <a:cs typeface="Courier New" pitchFamily="49" charset="0"/>
               </a:rPr>
-              <a:t>103</a:t>
-            </a:r>
-            <a:r>
-              <a:rPr lang="en-US" dirty="0" smtClean="0">
-                <a:latin typeface="Courier New" pitchFamily="49" charset="0"/>
-                <a:cs typeface="Courier New" pitchFamily="49" charset="0"/>
-              </a:rPr>
-              <a:t>location</a:t>
+              <a:t>103location</a:t>
             </a:r>
             <a:r>
               <a:rPr lang="en-US" dirty="0">
@@ -11619,9 +11606,6 @@
             </a:pPr>
             <a:r>
               <a:rPr lang="en-US" sz="2000" dirty="0">
-                <a:solidFill>
-                  <a:srgbClr val="FF0000"/>
-                </a:solidFill>
                 <a:latin typeface="Courier New" pitchFamily="49" charset="0"/>
                 <a:cs typeface="Courier New" pitchFamily="49" charset="0"/>
               </a:rPr>
@@ -12364,9 +12348,69 @@
           </a:p>
         </p:txBody>
       </p:sp>
+      <p:sp>
+        <p:nvSpPr>
+          <p:cNvPr id="4" name="Footer Placeholder 3"/>
+          <p:cNvSpPr>
+            <a:spLocks noGrp="1"/>
+          </p:cNvSpPr>
+          <p:nvPr>
+            <p:ph type="ftr" sz="quarter" idx="11"/>
+          </p:nvPr>
+        </p:nvSpPr>
+        <p:spPr/>
+        <p:txBody>
+          <a:bodyPr/>
+          <a:lstStyle/>
+          <a:p>
+            <a:pPr algn="r"/>
+            <a:endParaRPr lang="en-US" b="1" smtClean="0"/>
+          </a:p>
+          <a:p>
+            <a:pPr algn="r"/>
+            <a:r>
+              <a:rPr lang="en-US" b="1" smtClean="0"/>
+              <a:t>@m_nsiddique, @WebSciDL</a:t>
+            </a:r>
+            <a:endParaRPr lang="en-US" b="1" smtClean="0">
+              <a:solidFill>
+                <a:schemeClr val="lt1"/>
+              </a:solidFill>
+            </a:endParaRPr>
+          </a:p>
+          <a:p>
+            <a:pPr algn="r"/>
+            <a:endParaRPr lang="en-US" dirty="0"/>
+          </a:p>
+        </p:txBody>
+      </p:sp>
+      <p:sp>
+        <p:nvSpPr>
+          <p:cNvPr id="5" name="Slide Number Placeholder 4"/>
+          <p:cNvSpPr>
+            <a:spLocks noGrp="1"/>
+          </p:cNvSpPr>
+          <p:nvPr>
+            <p:ph type="sldNum" sz="quarter" idx="12"/>
+          </p:nvPr>
+        </p:nvSpPr>
+        <p:spPr/>
+        <p:txBody>
+          <a:bodyPr/>
+          <a:lstStyle/>
+          <a:p>
+            <a:fld id="{0CFEC368-1D7A-4F81-ABF6-AE0E36BAF64C}" type="slidenum">
+              <a:rPr lang="en-US" smtClean="0"/>
+              <a:pPr/>
+              <a:t>36</a:t>
+            </a:fld>
+            <a:endParaRPr lang="en-US"/>
+          </a:p>
+        </p:txBody>
+      </p:sp>
       <p:pic>
         <p:nvPicPr>
-          <p:cNvPr id="6" name="Content Placeholder 5"/>
+          <p:cNvPr id="8" name="Content Placeholder 7"/>
           <p:cNvPicPr>
             <a:picLocks noGrp="1" noChangeAspect="1"/>
           </p:cNvPicPr>
@@ -12388,81 +12432,21 @@
         </p:blipFill>
         <p:spPr>
           <a:xfrm>
-            <a:off x="6544" y="1981200"/>
-            <a:ext cx="9137456" cy="4436054"/>
+            <a:off x="990600" y="1524000"/>
+            <a:ext cx="7002348" cy="4876800"/>
           </a:xfrm>
         </p:spPr>
       </p:pic>
       <p:sp>
         <p:nvSpPr>
-          <p:cNvPr id="4" name="Footer Placeholder 3"/>
-          <p:cNvSpPr>
-            <a:spLocks noGrp="1"/>
-          </p:cNvSpPr>
-          <p:nvPr>
-            <p:ph type="ftr" sz="quarter" idx="11"/>
-          </p:nvPr>
-        </p:nvSpPr>
-        <p:spPr/>
-        <p:txBody>
-          <a:bodyPr/>
-          <a:lstStyle/>
-          <a:p>
-            <a:pPr algn="r"/>
-            <a:endParaRPr lang="en-US" b="1" smtClean="0"/>
-          </a:p>
-          <a:p>
-            <a:pPr algn="r"/>
-            <a:r>
-              <a:rPr lang="en-US" b="1" smtClean="0"/>
-              <a:t>@m_nsiddique, @WebSciDL</a:t>
-            </a:r>
-            <a:endParaRPr lang="en-US" b="1" smtClean="0">
-              <a:solidFill>
-                <a:schemeClr val="lt1"/>
-              </a:solidFill>
-            </a:endParaRPr>
-          </a:p>
-          <a:p>
-            <a:pPr algn="r"/>
-            <a:endParaRPr lang="en-US" dirty="0"/>
-          </a:p>
-        </p:txBody>
-      </p:sp>
-      <p:sp>
-        <p:nvSpPr>
-          <p:cNvPr id="5" name="Slide Number Placeholder 4"/>
-          <p:cNvSpPr>
-            <a:spLocks noGrp="1"/>
-          </p:cNvSpPr>
-          <p:nvPr>
-            <p:ph type="sldNum" sz="quarter" idx="12"/>
-          </p:nvPr>
-        </p:nvSpPr>
-        <p:spPr/>
-        <p:txBody>
-          <a:bodyPr/>
-          <a:lstStyle/>
-          <a:p>
-            <a:fld id="{0CFEC368-1D7A-4F81-ABF6-AE0E36BAF64C}" type="slidenum">
-              <a:rPr lang="en-US" smtClean="0"/>
-              <a:pPr/>
-              <a:t>36</a:t>
-            </a:fld>
-            <a:endParaRPr lang="en-US"/>
-          </a:p>
-        </p:txBody>
-      </p:sp>
-      <p:sp>
-        <p:nvSpPr>
           <p:cNvPr id="7" name="Rectangle 6"/>
           <p:cNvSpPr/>
           <p:nvPr/>
         </p:nvSpPr>
         <p:spPr>
           <a:xfrm>
-            <a:off x="2514600" y="3886200"/>
-            <a:ext cx="4114800" cy="1905000"/>
+            <a:off x="2362200" y="3429000"/>
+            <a:ext cx="5410200" cy="2819400"/>
           </a:xfrm>
           <a:prstGeom prst="rect">
             <a:avLst/>
@@ -12546,7 +12530,7 @@
           <a:p>
             <a:r>
               <a:rPr lang="en-US" dirty="0" smtClean="0"/>
-              <a:t>Viewed my tweet on a webpage</a:t>
+              <a:t>Embed tweet to a webpage</a:t>
             </a:r>
             <a:endParaRPr lang="en-US" dirty="0"/>
           </a:p>
@@ -12576,8 +12560,8 @@
         </p:blipFill>
         <p:spPr>
           <a:xfrm>
-            <a:off x="1371600" y="2209800"/>
-            <a:ext cx="6858000" cy="3912433"/>
+            <a:off x="1163628" y="1600200"/>
+            <a:ext cx="7065972" cy="5055102"/>
           </a:xfrm>
         </p:spPr>
       </p:pic>
@@ -12644,7 +12628,7 @@
     </p:spTree>
     <p:extLst>
       <p:ext uri="{BB962C8B-B14F-4D97-AF65-F5344CB8AC3E}">
-        <p14:creationId xmlns:p14="http://schemas.microsoft.com/office/powerpoint/2010/main" val="3508512384"/>
+        <p14:creationId xmlns:p14="http://schemas.microsoft.com/office/powerpoint/2010/main" val="1021137599"/>
       </p:ext>
     </p:extLst>
   </p:cSld>
@@ -12688,15 +12672,75 @@
           <a:p>
             <a:r>
               <a:rPr lang="en-US" dirty="0" smtClean="0"/>
-              <a:t>Deleted my tweet</a:t>
+              <a:t>Viewed my tweet on a webpage</a:t>
             </a:r>
             <a:endParaRPr lang="en-US" dirty="0"/>
+          </a:p>
+        </p:txBody>
+      </p:sp>
+      <p:sp>
+        <p:nvSpPr>
+          <p:cNvPr id="4" name="Footer Placeholder 3"/>
+          <p:cNvSpPr>
+            <a:spLocks noGrp="1"/>
+          </p:cNvSpPr>
+          <p:nvPr>
+            <p:ph type="ftr" sz="quarter" idx="11"/>
+          </p:nvPr>
+        </p:nvSpPr>
+        <p:spPr/>
+        <p:txBody>
+          <a:bodyPr/>
+          <a:lstStyle/>
+          <a:p>
+            <a:pPr algn="r"/>
+            <a:endParaRPr lang="en-US" b="1" smtClean="0"/>
+          </a:p>
+          <a:p>
+            <a:pPr algn="r"/>
+            <a:r>
+              <a:rPr lang="en-US" b="1" smtClean="0"/>
+              <a:t>@m_nsiddique, @WebSciDL</a:t>
+            </a:r>
+            <a:endParaRPr lang="en-US" b="1" smtClean="0">
+              <a:solidFill>
+                <a:schemeClr val="lt1"/>
+              </a:solidFill>
+            </a:endParaRPr>
+          </a:p>
+          <a:p>
+            <a:pPr algn="r"/>
+            <a:endParaRPr lang="en-US" dirty="0"/>
+          </a:p>
+        </p:txBody>
+      </p:sp>
+      <p:sp>
+        <p:nvSpPr>
+          <p:cNvPr id="5" name="Slide Number Placeholder 4"/>
+          <p:cNvSpPr>
+            <a:spLocks noGrp="1"/>
+          </p:cNvSpPr>
+          <p:nvPr>
+            <p:ph type="sldNum" sz="quarter" idx="12"/>
+          </p:nvPr>
+        </p:nvSpPr>
+        <p:spPr/>
+        <p:txBody>
+          <a:bodyPr/>
+          <a:lstStyle/>
+          <a:p>
+            <a:fld id="{0CFEC368-1D7A-4F81-ABF6-AE0E36BAF64C}" type="slidenum">
+              <a:rPr lang="en-US" smtClean="0"/>
+              <a:pPr/>
+              <a:t>38</a:t>
+            </a:fld>
+            <a:endParaRPr lang="en-US"/>
           </a:p>
         </p:txBody>
       </p:sp>
       <p:pic>
         <p:nvPicPr>
-          <p:cNvPr id="6" name="Content Placeholder 5"/>
+          <p:cNvPr id="7" name="Content Placeholder 6"/>
           <p:cNvPicPr>
             <a:picLocks noGrp="1" noChangeAspect="1"/>
           </p:cNvPicPr>
@@ -12718,11 +12762,64 @@
         </p:blipFill>
         <p:spPr>
           <a:xfrm>
-            <a:off x="228600" y="2057400"/>
-            <a:ext cx="8642525" cy="4218068"/>
+            <a:off x="914400" y="2209800"/>
+            <a:ext cx="7357343" cy="4124571"/>
           </a:xfrm>
         </p:spPr>
       </p:pic>
+    </p:spTree>
+    <p:extLst>
+      <p:ext uri="{BB962C8B-B14F-4D97-AF65-F5344CB8AC3E}">
+        <p14:creationId xmlns:p14="http://schemas.microsoft.com/office/powerpoint/2010/main" val="3508512384"/>
+      </p:ext>
+    </p:extLst>
+  </p:cSld>
+  <p:clrMapOvr>
+    <a:masterClrMapping/>
+  </p:clrMapOvr>
+</p:sld>
+</file>
+
+<file path=ppt/slides/slide39.xml><?xml version="1.0" encoding="utf-8"?>
+<p:sld xmlns:a="http://schemas.openxmlformats.org/drawingml/2006/main" xmlns:r="http://schemas.openxmlformats.org/officeDocument/2006/relationships" xmlns:p="http://schemas.openxmlformats.org/presentationml/2006/main">
+  <p:cSld>
+    <p:spTree>
+      <p:nvGrpSpPr>
+        <p:cNvPr id="1" name=""/>
+        <p:cNvGrpSpPr/>
+        <p:nvPr/>
+      </p:nvGrpSpPr>
+      <p:grpSpPr>
+        <a:xfrm>
+          <a:off x="0" y="0"/>
+          <a:ext cx="0" cy="0"/>
+          <a:chOff x="0" y="0"/>
+          <a:chExt cx="0" cy="0"/>
+        </a:xfrm>
+      </p:grpSpPr>
+      <p:sp>
+        <p:nvSpPr>
+          <p:cNvPr id="2" name="Title 1"/>
+          <p:cNvSpPr>
+            <a:spLocks noGrp="1"/>
+          </p:cNvSpPr>
+          <p:nvPr>
+            <p:ph type="title"/>
+          </p:nvPr>
+        </p:nvSpPr>
+        <p:spPr/>
+        <p:txBody>
+          <a:bodyPr/>
+          <a:lstStyle/>
+          <a:p>
+            <a:r>
+              <a:rPr lang="en-US" dirty="0" smtClean="0"/>
+              <a:t>Deleted my tweet</a:t>
+            </a:r>
+            <a:endParaRPr lang="en-US" dirty="0"/>
+          </a:p>
+        </p:txBody>
+      </p:sp>
       <p:sp>
         <p:nvSpPr>
           <p:cNvPr id="4" name="Footer Placeholder 3"/>
@@ -12777,12 +12874,41 @@
             <a:fld id="{0CFEC368-1D7A-4F81-ABF6-AE0E36BAF64C}" type="slidenum">
               <a:rPr lang="en-US" smtClean="0"/>
               <a:pPr/>
-              <a:t>38</a:t>
+              <a:t>39</a:t>
             </a:fld>
             <a:endParaRPr lang="en-US"/>
           </a:p>
         </p:txBody>
       </p:sp>
+      <p:pic>
+        <p:nvPicPr>
+          <p:cNvPr id="8" name="Content Placeholder 7"/>
+          <p:cNvPicPr>
+            <a:picLocks noGrp="1" noChangeAspect="1"/>
+          </p:cNvPicPr>
+          <p:nvPr>
+            <p:ph idx="1"/>
+          </p:nvPr>
+        </p:nvPicPr>
+        <p:blipFill>
+          <a:blip r:embed="rId2">
+            <a:extLst>
+              <a:ext uri="{28A0092B-C50C-407E-A947-70E740481C1C}">
+                <a14:useLocalDpi xmlns:a14="http://schemas.microsoft.com/office/drawing/2010/main" val="0"/>
+              </a:ext>
+            </a:extLst>
+          </a:blip>
+          <a:stretch>
+            <a:fillRect/>
+          </a:stretch>
+        </p:blipFill>
+        <p:spPr>
+          <a:xfrm>
+            <a:off x="1143000" y="1676400"/>
+            <a:ext cx="6952425" cy="4876800"/>
+          </a:xfrm>
+        </p:spPr>
+      </p:pic>
       <p:sp>
         <p:nvSpPr>
           <p:cNvPr id="7" name="Rectangle 6"/>
@@ -12791,8 +12917,8 @@
         </p:nvSpPr>
         <p:spPr>
           <a:xfrm>
-            <a:off x="2667000" y="3657600"/>
-            <a:ext cx="3810000" cy="1524000"/>
+            <a:off x="2667000" y="3048000"/>
+            <a:ext cx="5334000" cy="1828800"/>
           </a:xfrm>
           <a:prstGeom prst="rect">
             <a:avLst/>
@@ -12833,150 +12959,6 @@
     <p:extLst>
       <p:ext uri="{BB962C8B-B14F-4D97-AF65-F5344CB8AC3E}">
         <p14:creationId xmlns:p14="http://schemas.microsoft.com/office/powerpoint/2010/main" val="898323108"/>
-      </p:ext>
-    </p:extLst>
-  </p:cSld>
-  <p:clrMapOvr>
-    <a:masterClrMapping/>
-  </p:clrMapOvr>
-</p:sld>
-</file>
-
-<file path=ppt/slides/slide39.xml><?xml version="1.0" encoding="utf-8"?>
-<p:sld xmlns:a="http://schemas.openxmlformats.org/drawingml/2006/main" xmlns:r="http://schemas.openxmlformats.org/officeDocument/2006/relationships" xmlns:p="http://schemas.openxmlformats.org/presentationml/2006/main">
-  <p:cSld>
-    <p:spTree>
-      <p:nvGrpSpPr>
-        <p:cNvPr id="1" name=""/>
-        <p:cNvGrpSpPr/>
-        <p:nvPr/>
-      </p:nvGrpSpPr>
-      <p:grpSpPr>
-        <a:xfrm>
-          <a:off x="0" y="0"/>
-          <a:ext cx="0" cy="0"/>
-          <a:chOff x="0" y="0"/>
-          <a:chExt cx="0" cy="0"/>
-        </a:xfrm>
-      </p:grpSpPr>
-      <p:sp>
-        <p:nvSpPr>
-          <p:cNvPr id="2" name="Title 1"/>
-          <p:cNvSpPr>
-            <a:spLocks noGrp="1"/>
-          </p:cNvSpPr>
-          <p:nvPr>
-            <p:ph type="title"/>
-          </p:nvPr>
-        </p:nvSpPr>
-        <p:spPr/>
-        <p:txBody>
-          <a:bodyPr>
-            <a:normAutofit/>
-          </a:bodyPr>
-          <a:lstStyle/>
-          <a:p>
-            <a:r>
-              <a:rPr lang="en-US" dirty="0" smtClean="0"/>
-              <a:t>I can still see my deleted tweet</a:t>
-            </a:r>
-            <a:endParaRPr lang="en-US" dirty="0"/>
-          </a:p>
-        </p:txBody>
-      </p:sp>
-      <p:pic>
-        <p:nvPicPr>
-          <p:cNvPr id="6" name="Content Placeholder 5"/>
-          <p:cNvPicPr>
-            <a:picLocks noGrp="1" noChangeAspect="1"/>
-          </p:cNvPicPr>
-          <p:nvPr>
-            <p:ph idx="1"/>
-          </p:nvPr>
-        </p:nvPicPr>
-        <p:blipFill>
-          <a:blip r:embed="rId2">
-            <a:extLst>
-              <a:ext uri="{28A0092B-C50C-407E-A947-70E740481C1C}">
-                <a14:useLocalDpi xmlns:a14="http://schemas.microsoft.com/office/drawing/2010/main" val="0"/>
-              </a:ext>
-            </a:extLst>
-          </a:blip>
-          <a:stretch>
-            <a:fillRect/>
-          </a:stretch>
-        </p:blipFill>
-        <p:spPr>
-          <a:xfrm>
-            <a:off x="990600" y="2209800"/>
-            <a:ext cx="7139420" cy="3886200"/>
-          </a:xfrm>
-        </p:spPr>
-      </p:pic>
-      <p:sp>
-        <p:nvSpPr>
-          <p:cNvPr id="4" name="Footer Placeholder 3"/>
-          <p:cNvSpPr>
-            <a:spLocks noGrp="1"/>
-          </p:cNvSpPr>
-          <p:nvPr>
-            <p:ph type="ftr" sz="quarter" idx="11"/>
-          </p:nvPr>
-        </p:nvSpPr>
-        <p:spPr/>
-        <p:txBody>
-          <a:bodyPr/>
-          <a:lstStyle/>
-          <a:p>
-            <a:pPr algn="r"/>
-            <a:endParaRPr lang="en-US" b="1" smtClean="0"/>
-          </a:p>
-          <a:p>
-            <a:pPr algn="r"/>
-            <a:r>
-              <a:rPr lang="en-US" b="1" smtClean="0"/>
-              <a:t>@m_nsiddique, @WebSciDL</a:t>
-            </a:r>
-            <a:endParaRPr lang="en-US" b="1" smtClean="0">
-              <a:solidFill>
-                <a:schemeClr val="lt1"/>
-              </a:solidFill>
-            </a:endParaRPr>
-          </a:p>
-          <a:p>
-            <a:pPr algn="r"/>
-            <a:endParaRPr lang="en-US" dirty="0"/>
-          </a:p>
-        </p:txBody>
-      </p:sp>
-      <p:sp>
-        <p:nvSpPr>
-          <p:cNvPr id="5" name="Slide Number Placeholder 4"/>
-          <p:cNvSpPr>
-            <a:spLocks noGrp="1"/>
-          </p:cNvSpPr>
-          <p:nvPr>
-            <p:ph type="sldNum" sz="quarter" idx="12"/>
-          </p:nvPr>
-        </p:nvSpPr>
-        <p:spPr/>
-        <p:txBody>
-          <a:bodyPr/>
-          <a:lstStyle/>
-          <a:p>
-            <a:fld id="{0CFEC368-1D7A-4F81-ABF6-AE0E36BAF64C}" type="slidenum">
-              <a:rPr lang="en-US" smtClean="0"/>
-              <a:pPr/>
-              <a:t>39</a:t>
-            </a:fld>
-            <a:endParaRPr lang="en-US"/>
-          </a:p>
-        </p:txBody>
-      </p:sp>
-    </p:spTree>
-    <p:extLst>
-      <p:ext uri="{BB962C8B-B14F-4D97-AF65-F5344CB8AC3E}">
-        <p14:creationId xmlns:p14="http://schemas.microsoft.com/office/powerpoint/2010/main" val="3602218774"/>
       </p:ext>
     </p:extLst>
   </p:cSld>
@@ -13205,12 +13187,14 @@
         </p:nvSpPr>
         <p:spPr/>
         <p:txBody>
-          <a:bodyPr/>
+          <a:bodyPr>
+            <a:normAutofit/>
+          </a:bodyPr>
           <a:lstStyle/>
           <a:p>
             <a:r>
               <a:rPr lang="en-US" dirty="0" smtClean="0"/>
-              <a:t>Twitter’s Deleted Tweets Policy</a:t>
+              <a:t>I can still see my deleted tweet</a:t>
             </a:r>
             <a:endParaRPr lang="en-US" dirty="0"/>
           </a:p>
@@ -13271,6 +13255,148 @@
               <a:rPr lang="en-US" smtClean="0"/>
               <a:pPr/>
               <a:t>40</a:t>
+            </a:fld>
+            <a:endParaRPr lang="en-US"/>
+          </a:p>
+        </p:txBody>
+      </p:sp>
+      <p:pic>
+        <p:nvPicPr>
+          <p:cNvPr id="7" name="Content Placeholder 6"/>
+          <p:cNvPicPr>
+            <a:picLocks noGrp="1" noChangeAspect="1"/>
+          </p:cNvPicPr>
+          <p:nvPr>
+            <p:ph idx="1"/>
+          </p:nvPr>
+        </p:nvPicPr>
+        <p:blipFill>
+          <a:blip r:embed="rId2">
+            <a:extLst>
+              <a:ext uri="{28A0092B-C50C-407E-A947-70E740481C1C}">
+                <a14:useLocalDpi xmlns:a14="http://schemas.microsoft.com/office/drawing/2010/main" val="0"/>
+              </a:ext>
+            </a:extLst>
+          </a:blip>
+          <a:stretch>
+            <a:fillRect/>
+          </a:stretch>
+        </p:blipFill>
+        <p:spPr>
+          <a:xfrm>
+            <a:off x="1295400" y="2209800"/>
+            <a:ext cx="6347722" cy="3424429"/>
+          </a:xfrm>
+        </p:spPr>
+      </p:pic>
+    </p:spTree>
+    <p:extLst>
+      <p:ext uri="{BB962C8B-B14F-4D97-AF65-F5344CB8AC3E}">
+        <p14:creationId xmlns:p14="http://schemas.microsoft.com/office/powerpoint/2010/main" val="3602218774"/>
+      </p:ext>
+    </p:extLst>
+  </p:cSld>
+  <p:clrMapOvr>
+    <a:masterClrMapping/>
+  </p:clrMapOvr>
+</p:sld>
+</file>
+
+<file path=ppt/slides/slide41.xml><?xml version="1.0" encoding="utf-8"?>
+<p:sld xmlns:a="http://schemas.openxmlformats.org/drawingml/2006/main" xmlns:r="http://schemas.openxmlformats.org/officeDocument/2006/relationships" xmlns:p="http://schemas.openxmlformats.org/presentationml/2006/main">
+  <p:cSld>
+    <p:spTree>
+      <p:nvGrpSpPr>
+        <p:cNvPr id="1" name=""/>
+        <p:cNvGrpSpPr/>
+        <p:nvPr/>
+      </p:nvGrpSpPr>
+      <p:grpSpPr>
+        <a:xfrm>
+          <a:off x="0" y="0"/>
+          <a:ext cx="0" cy="0"/>
+          <a:chOff x="0" y="0"/>
+          <a:chExt cx="0" cy="0"/>
+        </a:xfrm>
+      </p:grpSpPr>
+      <p:sp>
+        <p:nvSpPr>
+          <p:cNvPr id="2" name="Title 1"/>
+          <p:cNvSpPr>
+            <a:spLocks noGrp="1"/>
+          </p:cNvSpPr>
+          <p:nvPr>
+            <p:ph type="title"/>
+          </p:nvPr>
+        </p:nvSpPr>
+        <p:spPr/>
+        <p:txBody>
+          <a:bodyPr/>
+          <a:lstStyle/>
+          <a:p>
+            <a:r>
+              <a:rPr lang="en-US" dirty="0" smtClean="0"/>
+              <a:t>Twitter’s Deleted Tweets Policy</a:t>
+            </a:r>
+            <a:endParaRPr lang="en-US" dirty="0"/>
+          </a:p>
+        </p:txBody>
+      </p:sp>
+      <p:sp>
+        <p:nvSpPr>
+          <p:cNvPr id="4" name="Footer Placeholder 3"/>
+          <p:cNvSpPr>
+            <a:spLocks noGrp="1"/>
+          </p:cNvSpPr>
+          <p:nvPr>
+            <p:ph type="ftr" sz="quarter" idx="11"/>
+          </p:nvPr>
+        </p:nvSpPr>
+        <p:spPr/>
+        <p:txBody>
+          <a:bodyPr/>
+          <a:lstStyle/>
+          <a:p>
+            <a:pPr algn="r"/>
+            <a:endParaRPr lang="en-US" b="1" smtClean="0"/>
+          </a:p>
+          <a:p>
+            <a:pPr algn="r"/>
+            <a:r>
+              <a:rPr lang="en-US" b="1" smtClean="0"/>
+              <a:t>@m_nsiddique, @WebSciDL</a:t>
+            </a:r>
+            <a:endParaRPr lang="en-US" b="1" smtClean="0">
+              <a:solidFill>
+                <a:schemeClr val="lt1"/>
+              </a:solidFill>
+            </a:endParaRPr>
+          </a:p>
+          <a:p>
+            <a:pPr algn="r"/>
+            <a:endParaRPr lang="en-US" dirty="0"/>
+          </a:p>
+        </p:txBody>
+      </p:sp>
+      <p:sp>
+        <p:nvSpPr>
+          <p:cNvPr id="5" name="Slide Number Placeholder 4"/>
+          <p:cNvSpPr>
+            <a:spLocks noGrp="1"/>
+          </p:cNvSpPr>
+          <p:nvPr>
+            <p:ph type="sldNum" sz="quarter" idx="12"/>
+          </p:nvPr>
+        </p:nvSpPr>
+        <p:spPr/>
+        <p:txBody>
+          <a:bodyPr/>
+          <a:lstStyle/>
+          <a:p>
+            <a:fld id="{0CFEC368-1D7A-4F81-ABF6-AE0E36BAF64C}" type="slidenum">
+              <a:rPr lang="en-US" smtClean="0"/>
+              <a:pPr/>
+              <a:t>41</a:t>
             </a:fld>
             <a:endParaRPr lang="en-US"/>
           </a:p>
@@ -13564,7 +13690,7 @@
 </p:sld>
 </file>
 
-<file path=ppt/slides/slide41.xml><?xml version="1.0" encoding="utf-8"?>
+<file path=ppt/slides/slide42.xml><?xml version="1.0" encoding="utf-8"?>
 <p:sld xmlns:a="http://schemas.openxmlformats.org/drawingml/2006/main" xmlns:r="http://schemas.openxmlformats.org/officeDocument/2006/relationships" xmlns:p="http://schemas.openxmlformats.org/presentationml/2006/main">
   <p:cSld>
     <p:spTree>
@@ -13616,7 +13742,9 @@
         </p:nvSpPr>
         <p:spPr/>
         <p:txBody>
-          <a:bodyPr/>
+          <a:bodyPr>
+            <a:normAutofit/>
+          </a:bodyPr>
           <a:lstStyle/>
           <a:p>
             <a:r>
@@ -13633,20 +13761,29 @@
           <a:p>
             <a:r>
               <a:rPr lang="en-US" dirty="0" smtClean="0"/>
-              <a:t>Tweet returns 404 meaning it is be deleted.</a:t>
-            </a:r>
-          </a:p>
-          <a:p>
+              <a:t>Tweets returning status code of 404 are deleted.</a:t>
+            </a:r>
             <a:endParaRPr lang="en-US" dirty="0" smtClean="0"/>
           </a:p>
           <a:p>
+            <a:endParaRPr lang="en-US" dirty="0" smtClean="0"/>
+          </a:p>
+          <a:p>
             <a:r>
               <a:rPr lang="en-US" dirty="0" smtClean="0"/>
-              <a:t>Tweet returns 302 meaning the </a:t>
+              <a:t>Tweet </a:t>
             </a:r>
             <a:r>
               <a:rPr lang="en-US" dirty="0" smtClean="0"/>
-              <a:t>tweets are protected or the account is suspended.</a:t>
+              <a:t>returning</a:t>
+            </a:r>
+            <a:r>
+              <a:rPr lang="en-US" dirty="0" smtClean="0"/>
+              <a:t> a redirect status code</a:t>
+            </a:r>
+            <a:r>
+              <a:rPr lang="en-US" dirty="0" smtClean="0"/>
+              <a:t> of 302 can be either a protected tweet or a tweet belonging to a suspended account.</a:t>
             </a:r>
             <a:endParaRPr lang="en-US" dirty="0" smtClean="0"/>
           </a:p>
@@ -13656,7 +13793,19 @@
           <a:p>
             <a:r>
               <a:rPr lang="en-US" dirty="0" smtClean="0"/>
-              <a:t>Original tweet returns 200 but retweet is 404 meaning it is a </a:t>
+              <a:t>Original tweet </a:t>
+            </a:r>
+            <a:r>
+              <a:rPr lang="en-US" dirty="0" smtClean="0"/>
+              <a:t>returning status code of 200 </a:t>
+            </a:r>
+            <a:r>
+              <a:rPr lang="en-US" dirty="0" smtClean="0"/>
+              <a:t>but </a:t>
+            </a:r>
+            <a:r>
+              <a:rPr lang="en-US" dirty="0" smtClean="0"/>
+              <a:t>the retweet returns a status code of  404 making it a </a:t>
             </a:r>
             <a:r>
               <a:rPr lang="en-US" dirty="0" err="1" smtClean="0"/>
@@ -13724,7 +13873,7 @@
             <a:fld id="{0CFEC368-1D7A-4F81-ABF6-AE0E36BAF64C}" type="slidenum">
               <a:rPr lang="en-US" smtClean="0"/>
               <a:pPr/>
-              <a:t>41</a:t>
+              <a:t>42</a:t>
             </a:fld>
             <a:endParaRPr lang="en-US"/>
           </a:p>

</xml_diff>

<commit_message>
Review comments for presenation 2 and 3 fixed
</commit_message>
<xml_diff>
--- a/assignments/siddique/week-08-presentation/Delete Forensics.pptx
+++ b/assignments/siddique/week-08-presentation/Delete Forensics.pptx
@@ -233,7 +233,7 @@
           <a:p>
             <a:fld id="{6351AA7D-34FE-415D-B592-BE52F43E6D85}" type="datetimeFigureOut">
               <a:rPr lang="en-US" smtClean="0"/>
-              <a:t>3/6/2019</a:t>
+              <a:t>4/29/2019</a:t>
             </a:fld>
             <a:endParaRPr lang="en-US"/>
           </a:p>
@@ -689,7 +689,7 @@
           <a:p>
             <a:fld id="{FE4C5FF7-164E-4FB3-8F5F-87F447AD3617}" type="datetime2">
               <a:rPr lang="en-US" smtClean="0"/>
-              <a:t>Wednesday, March 06, 2019</a:t>
+              <a:t>Monday, April 29, 2019</a:t>
             </a:fld>
             <a:endParaRPr lang="en-US"/>
           </a:p>
@@ -891,7 +891,7 @@
           <a:p>
             <a:fld id="{11BBF3B1-0129-439F-83AC-A9C2254D58EF}" type="datetime2">
               <a:rPr lang="en-US" smtClean="0"/>
-              <a:t>Wednesday, March 06, 2019</a:t>
+              <a:t>Monday, April 29, 2019</a:t>
             </a:fld>
             <a:endParaRPr lang="en-US"/>
           </a:p>
@@ -1068,7 +1068,7 @@
           <a:p>
             <a:fld id="{A48FCA47-CCCD-4F27-AE5D-65243C898850}" type="datetime2">
               <a:rPr lang="en-US" smtClean="0"/>
-              <a:t>Wednesday, March 06, 2019</a:t>
+              <a:t>Monday, April 29, 2019</a:t>
             </a:fld>
             <a:endParaRPr lang="en-US"/>
           </a:p>
@@ -1235,7 +1235,7 @@
           <a:p>
             <a:fld id="{6B00123E-B2B2-4CF0-B3EA-B1D89533966A}" type="datetime2">
               <a:rPr lang="en-US" smtClean="0"/>
-              <a:t>Wednesday, March 06, 2019</a:t>
+              <a:t>Monday, April 29, 2019</a:t>
             </a:fld>
             <a:endParaRPr lang="en-US"/>
           </a:p>
@@ -1509,7 +1509,7 @@
           <a:p>
             <a:fld id="{37EF0FEC-9224-4709-8015-D2AECA4B3087}" type="datetime2">
               <a:rPr lang="en-US" smtClean="0"/>
-              <a:t>Wednesday, March 06, 2019</a:t>
+              <a:t>Monday, April 29, 2019</a:t>
             </a:fld>
             <a:endParaRPr lang="en-US"/>
           </a:p>
@@ -1829,7 +1829,7 @@
           <a:p>
             <a:fld id="{85B0574B-5D19-46F1-B781-53379DDC088E}" type="datetime2">
               <a:rPr lang="en-US" smtClean="0"/>
-              <a:t>Wednesday, March 06, 2019</a:t>
+              <a:t>Monday, April 29, 2019</a:t>
             </a:fld>
             <a:endParaRPr lang="en-US"/>
           </a:p>
@@ -2297,7 +2297,7 @@
           <a:p>
             <a:fld id="{6D8CD3A5-6E9B-4D41-AE34-101F096DC5DC}" type="datetime2">
               <a:rPr lang="en-US" smtClean="0"/>
-              <a:t>Wednesday, March 06, 2019</a:t>
+              <a:t>Monday, April 29, 2019</a:t>
             </a:fld>
             <a:endParaRPr lang="en-US"/>
           </a:p>
@@ -2447,7 +2447,7 @@
           <a:p>
             <a:fld id="{43C2EF53-CC42-4B4F-90B8-EB595C46BE20}" type="datetime2">
               <a:rPr lang="en-US" smtClean="0"/>
-              <a:t>Wednesday, March 06, 2019</a:t>
+              <a:t>Monday, April 29, 2019</a:t>
             </a:fld>
             <a:endParaRPr lang="en-US"/>
           </a:p>
@@ -2539,7 +2539,7 @@
           <a:p>
             <a:fld id="{D8C7A3FE-9D3A-4613-9424-084AB95F333E}" type="datetime2">
               <a:rPr lang="en-US" smtClean="0"/>
-              <a:t>Wednesday, March 06, 2019</a:t>
+              <a:t>Monday, April 29, 2019</a:t>
             </a:fld>
             <a:endParaRPr lang="en-US"/>
           </a:p>
@@ -2815,7 +2815,7 @@
           <a:p>
             <a:fld id="{D578A4FF-346C-4B68-ADAD-D03386153A04}" type="datetime2">
               <a:rPr lang="en-US" smtClean="0"/>
-              <a:t>Wednesday, March 06, 2019</a:t>
+              <a:t>Monday, April 29, 2019</a:t>
             </a:fld>
             <a:endParaRPr lang="en-US"/>
           </a:p>
@@ -3122,7 +3122,7 @@
           <a:p>
             <a:fld id="{EED75271-7DB8-42CC-A85C-D4C01052A9B2}" type="datetime2">
               <a:rPr lang="en-US" smtClean="0"/>
-              <a:t>Wednesday, March 06, 2019</a:t>
+              <a:t>Monday, April 29, 2019</a:t>
             </a:fld>
             <a:endParaRPr lang="en-US"/>
           </a:p>
@@ -3422,7 +3422,7 @@
           <a:p>
             <a:fld id="{075E210E-5249-4C21-846C-CFC108F75D77}" type="datetime2">
               <a:rPr lang="en-US" smtClean="0"/>
-              <a:t>Wednesday, March 06, 2019</a:t>
+              <a:t>Monday, April 29, 2019</a:t>
             </a:fld>
             <a:endParaRPr lang="en-US" dirty="0"/>
           </a:p>
@@ -6080,7 +6080,7 @@
         <p:spPr/>
         <p:txBody>
           <a:bodyPr>
-            <a:normAutofit/>
+            <a:normAutofit fontScale="85000" lnSpcReduction="20000"/>
           </a:bodyPr>
           <a:lstStyle/>
           <a:p>
@@ -6088,21 +6088,21 @@
               <a:buNone/>
             </a:pPr>
             <a:r>
-              <a:rPr lang="en-US" dirty="0" err="1">
+              <a:rPr lang="en-US" dirty="0" err="1" smtClean="0">
                 <a:latin typeface="Courier New" pitchFamily="49" charset="0"/>
                 <a:cs typeface="Courier New" pitchFamily="49" charset="0"/>
               </a:rPr>
               <a:t>msiddique@atria</a:t>
             </a:r>
             <a:r>
-              <a:rPr lang="en-US" dirty="0">
-                <a:latin typeface="Courier New" pitchFamily="49" charset="0"/>
-                <a:cs typeface="Courier New" pitchFamily="49" charset="0"/>
-              </a:rPr>
-              <a:t>:~$ curl -I </a:t>
-            </a:r>
-            <a:r>
-              <a:rPr lang="en-US" b="1" dirty="0">
+              <a:rPr lang="en-US" dirty="0" smtClean="0">
+                <a:latin typeface="Courier New" pitchFamily="49" charset="0"/>
+                <a:cs typeface="Courier New" pitchFamily="49" charset="0"/>
+              </a:rPr>
+              <a:t>:~$ curl -IL </a:t>
+            </a:r>
+            <a:r>
+              <a:rPr lang="en-US" b="1" dirty="0" smtClean="0">
                 <a:solidFill>
                   <a:srgbClr val="FF0000"/>
                 </a:solidFill>
@@ -6110,45 +6110,6 @@
                 <a:cs typeface="Courier New" pitchFamily="49" charset="0"/>
               </a:rPr>
               <a:t>https://twitter.com/naumanspike/status/914874522859446273</a:t>
-            </a:r>
-          </a:p>
-          <a:p>
-            <a:pPr marL="0" indent="0">
-              <a:buNone/>
-            </a:pPr>
-            <a:r>
-              <a:rPr lang="en-US" dirty="0">
-                <a:solidFill>
-                  <a:srgbClr val="FF0000"/>
-                </a:solidFill>
-                <a:latin typeface="Courier New" pitchFamily="49" charset="0"/>
-                <a:cs typeface="Courier New" pitchFamily="49" charset="0"/>
-              </a:rPr>
-              <a:t>HTTP/1.1 302 Found</a:t>
-            </a:r>
-          </a:p>
-          <a:p>
-            <a:pPr marL="0" indent="0">
-              <a:buNone/>
-            </a:pPr>
-            <a:r>
-              <a:rPr lang="en-US" dirty="0">
-                <a:latin typeface="Courier New" pitchFamily="49" charset="0"/>
-                <a:cs typeface="Courier New" pitchFamily="49" charset="0"/>
-              </a:rPr>
-              <a:t>cache-control: no-cache, no-store, must-revalidate, pre-check=0, post-check=0</a:t>
-            </a:r>
-          </a:p>
-          <a:p>
-            <a:pPr marL="0" indent="0">
-              <a:buNone/>
-            </a:pPr>
-            <a:r>
-              <a:rPr lang="en-US" dirty="0">
-                <a:latin typeface="Courier New" pitchFamily="49" charset="0"/>
-                <a:cs typeface="Courier New" pitchFamily="49" charset="0"/>
-              </a:rPr>
-              <a:t>content-length: 121</a:t>
             </a:r>
           </a:p>
           <a:p>
@@ -6163,29 +6124,37 @@
                 <a:latin typeface="Courier New" pitchFamily="49" charset="0"/>
                 <a:cs typeface="Courier New" pitchFamily="49" charset="0"/>
               </a:rPr>
-              <a:t>location</a:t>
-            </a:r>
-            <a:r>
-              <a:rPr lang="en-US" dirty="0">
-                <a:solidFill>
-                  <a:srgbClr val="FF0000"/>
-                </a:solidFill>
-                <a:latin typeface="Courier New" pitchFamily="49" charset="0"/>
-                <a:cs typeface="Courier New" pitchFamily="49" charset="0"/>
-              </a:rPr>
-              <a:t>: </a:t>
-            </a:r>
-            <a:r>
-              <a:rPr lang="en-US" dirty="0">
-                <a:solidFill>
-                  <a:srgbClr val="FF0000"/>
-                </a:solidFill>
-                <a:latin typeface="Courier New" pitchFamily="49" charset="0"/>
-                <a:cs typeface="Courier New" pitchFamily="49" charset="0"/>
-                <a:hlinkClick r:id="rId2"/>
-              </a:rPr>
-              <a:t>https://</a:t>
-            </a:r>
+              <a:t>HTTP/1.1 302 Found</a:t>
+            </a:r>
+          </a:p>
+          <a:p>
+            <a:pPr marL="0" indent="0">
+              <a:buNone/>
+            </a:pPr>
+            <a:r>
+              <a:rPr lang="en-US" dirty="0" smtClean="0">
+                <a:latin typeface="Courier New" pitchFamily="49" charset="0"/>
+                <a:cs typeface="Courier New" pitchFamily="49" charset="0"/>
+              </a:rPr>
+              <a:t>cache-control: no-cache, no-store, must-revalidate, pre-check=0, post-check=0</a:t>
+            </a:r>
+          </a:p>
+          <a:p>
+            <a:pPr marL="0" indent="0">
+              <a:buNone/>
+            </a:pPr>
+            <a:r>
+              <a:rPr lang="en-US" dirty="0" smtClean="0">
+                <a:latin typeface="Courier New" pitchFamily="49" charset="0"/>
+                <a:cs typeface="Courier New" pitchFamily="49" charset="0"/>
+              </a:rPr>
+              <a:t>content-length: 121</a:t>
+            </a:r>
+          </a:p>
+          <a:p>
+            <a:pPr marL="0" indent="0">
+              <a:buNone/>
+            </a:pPr>
             <a:r>
               <a:rPr lang="en-US" dirty="0" smtClean="0">
                 <a:solidFill>
@@ -6193,9 +6162,19 @@
                 </a:solidFill>
                 <a:latin typeface="Courier New" pitchFamily="49" charset="0"/>
                 <a:cs typeface="Courier New" pitchFamily="49" charset="0"/>
+              </a:rPr>
+              <a:t>location: </a:t>
+            </a:r>
+            <a:r>
+              <a:rPr lang="en-US" dirty="0" smtClean="0">
+                <a:solidFill>
+                  <a:srgbClr val="FF0000"/>
+                </a:solidFill>
+                <a:latin typeface="Courier New" pitchFamily="49" charset="0"/>
+                <a:cs typeface="Courier New" pitchFamily="49" charset="0"/>
                 <a:hlinkClick r:id="rId2"/>
               </a:rPr>
-              <a:t>twitter.com/naumanspike?protected_redirect=true</a:t>
+              <a:t>https://twitter.com/naumanspike?protected_redirect=true</a:t>
             </a:r>
             <a:endParaRPr lang="en-US" dirty="0" smtClean="0">
               <a:solidFill>
@@ -6230,12 +6209,98 @@
               </a:rPr>
               <a:t>…</a:t>
             </a:r>
+          </a:p>
+          <a:p>
+            <a:pPr marL="0" indent="0">
+              <a:buNone/>
+            </a:pPr>
             <a:endParaRPr lang="en-US" dirty="0">
               <a:latin typeface="Courier New" pitchFamily="49" charset="0"/>
               <a:cs typeface="Courier New" pitchFamily="49" charset="0"/>
             </a:endParaRPr>
           </a:p>
           <a:p>
+            <a:pPr marL="0" indent="0">
+              <a:buNone/>
+            </a:pPr>
+            <a:r>
+              <a:rPr lang="en-US" dirty="0">
+                <a:latin typeface="Courier New" pitchFamily="49" charset="0"/>
+                <a:cs typeface="Courier New" pitchFamily="49" charset="0"/>
+              </a:rPr>
+              <a:t>HTTP/1.1 200 OK</a:t>
+            </a:r>
+          </a:p>
+          <a:p>
+            <a:pPr marL="0" indent="0">
+              <a:buNone/>
+            </a:pPr>
+            <a:r>
+              <a:rPr lang="en-US" dirty="0" smtClean="0">
+                <a:latin typeface="Courier New" pitchFamily="49" charset="0"/>
+                <a:cs typeface="Courier New" pitchFamily="49" charset="0"/>
+              </a:rPr>
+              <a:t>content-length</a:t>
+            </a:r>
+            <a:r>
+              <a:rPr lang="en-US" dirty="0">
+                <a:latin typeface="Courier New" pitchFamily="49" charset="0"/>
+                <a:cs typeface="Courier New" pitchFamily="49" charset="0"/>
+              </a:rPr>
+              <a:t>: 314326</a:t>
+            </a:r>
+          </a:p>
+          <a:p>
+            <a:pPr marL="0" indent="0">
+              <a:buNone/>
+            </a:pPr>
+            <a:r>
+              <a:rPr lang="en-US" dirty="0">
+                <a:latin typeface="Courier New" pitchFamily="49" charset="0"/>
+                <a:cs typeface="Courier New" pitchFamily="49" charset="0"/>
+              </a:rPr>
+              <a:t>content-type: text/</a:t>
+            </a:r>
+            <a:r>
+              <a:rPr lang="en-US" dirty="0" err="1">
+                <a:latin typeface="Courier New" pitchFamily="49" charset="0"/>
+                <a:cs typeface="Courier New" pitchFamily="49" charset="0"/>
+              </a:rPr>
+              <a:t>html;charset</a:t>
+            </a:r>
+            <a:r>
+              <a:rPr lang="en-US" dirty="0">
+                <a:latin typeface="Courier New" pitchFamily="49" charset="0"/>
+                <a:cs typeface="Courier New" pitchFamily="49" charset="0"/>
+              </a:rPr>
+              <a:t>=utf-8</a:t>
+            </a:r>
+          </a:p>
+          <a:p>
+            <a:pPr marL="0" indent="0">
+              <a:buNone/>
+            </a:pPr>
+            <a:r>
+              <a:rPr lang="en-US" dirty="0" smtClean="0">
+                <a:latin typeface="Courier New" pitchFamily="49" charset="0"/>
+                <a:cs typeface="Courier New" pitchFamily="49" charset="0"/>
+              </a:rPr>
+              <a:t>…</a:t>
+            </a:r>
+            <a:r>
+              <a:rPr lang="en-US" dirty="0" err="1" smtClean="0">
+                <a:latin typeface="Courier New" pitchFamily="49" charset="0"/>
+                <a:cs typeface="Courier New" pitchFamily="49" charset="0"/>
+              </a:rPr>
+              <a:t>Deletia</a:t>
+            </a:r>
+            <a:r>
+              <a:rPr lang="en-US" dirty="0" smtClean="0">
+                <a:latin typeface="Courier New" pitchFamily="49" charset="0"/>
+                <a:cs typeface="Courier New" pitchFamily="49" charset="0"/>
+              </a:rPr>
+              <a:t>…</a:t>
+            </a:r>
             <a:endParaRPr lang="en-US" dirty="0"/>
           </a:p>
         </p:txBody>
@@ -7599,7 +7664,7 @@
         <p:spPr/>
         <p:txBody>
           <a:bodyPr>
-            <a:normAutofit/>
+            <a:normAutofit fontScale="92500" lnSpcReduction="20000"/>
           </a:bodyPr>
           <a:lstStyle/>
           <a:p>
@@ -7811,6 +7876,107 @@
               </a:rPr>
               <a:t>…</a:t>
             </a:r>
+          </a:p>
+          <a:p>
+            <a:pPr marL="0" indent="0">
+              <a:buNone/>
+            </a:pPr>
+            <a:endParaRPr lang="en-US" sz="2000" dirty="0">
+              <a:latin typeface="Courier New" pitchFamily="49" charset="0"/>
+              <a:cs typeface="Courier New" pitchFamily="49" charset="0"/>
+            </a:endParaRPr>
+          </a:p>
+          <a:p>
+            <a:pPr marL="0" indent="0">
+              <a:buNone/>
+            </a:pPr>
+            <a:r>
+              <a:rPr lang="en-US" sz="2000" dirty="0">
+                <a:latin typeface="Courier New" pitchFamily="49" charset="0"/>
+                <a:cs typeface="Courier New" pitchFamily="49" charset="0"/>
+              </a:rPr>
+              <a:t>HTTP/1.1 200 OK</a:t>
+            </a:r>
+          </a:p>
+          <a:p>
+            <a:pPr marL="0" indent="0">
+              <a:buNone/>
+            </a:pPr>
+            <a:r>
+              <a:rPr lang="en-US" sz="2000" dirty="0" smtClean="0">
+                <a:latin typeface="Courier New" pitchFamily="49" charset="0"/>
+                <a:cs typeface="Courier New" pitchFamily="49" charset="0"/>
+              </a:rPr>
+              <a:t>content-length</a:t>
+            </a:r>
+            <a:r>
+              <a:rPr lang="en-US" sz="2000" dirty="0">
+                <a:latin typeface="Courier New" pitchFamily="49" charset="0"/>
+                <a:cs typeface="Courier New" pitchFamily="49" charset="0"/>
+              </a:rPr>
+              <a:t>: 282424</a:t>
+            </a:r>
+          </a:p>
+          <a:p>
+            <a:pPr marL="0" indent="0">
+              <a:buNone/>
+            </a:pPr>
+            <a:r>
+              <a:rPr lang="en-US" sz="2000" dirty="0">
+                <a:latin typeface="Courier New" pitchFamily="49" charset="0"/>
+                <a:cs typeface="Courier New" pitchFamily="49" charset="0"/>
+              </a:rPr>
+              <a:t>content-type: text/</a:t>
+            </a:r>
+            <a:r>
+              <a:rPr lang="en-US" sz="2000" dirty="0" err="1">
+                <a:latin typeface="Courier New" pitchFamily="49" charset="0"/>
+                <a:cs typeface="Courier New" pitchFamily="49" charset="0"/>
+              </a:rPr>
+              <a:t>html;charset</a:t>
+            </a:r>
+            <a:r>
+              <a:rPr lang="en-US" sz="2000" dirty="0">
+                <a:latin typeface="Courier New" pitchFamily="49" charset="0"/>
+                <a:cs typeface="Courier New" pitchFamily="49" charset="0"/>
+              </a:rPr>
+              <a:t>=utf-8</a:t>
+            </a:r>
+          </a:p>
+          <a:p>
+            <a:pPr marL="0" indent="0">
+              <a:buNone/>
+            </a:pPr>
+            <a:r>
+              <a:rPr lang="en-US" sz="2000" dirty="0" smtClean="0">
+                <a:latin typeface="Courier New" pitchFamily="49" charset="0"/>
+                <a:cs typeface="Courier New" pitchFamily="49" charset="0"/>
+              </a:rPr>
+              <a:t>…</a:t>
+            </a:r>
+            <a:r>
+              <a:rPr lang="en-US" sz="2000" dirty="0" err="1" smtClean="0">
+                <a:latin typeface="Courier New" pitchFamily="49" charset="0"/>
+                <a:cs typeface="Courier New" pitchFamily="49" charset="0"/>
+              </a:rPr>
+              <a:t>Deletia</a:t>
+            </a:r>
+            <a:r>
+              <a:rPr lang="en-US" sz="2000" dirty="0" smtClean="0">
+                <a:latin typeface="Courier New" pitchFamily="49" charset="0"/>
+                <a:cs typeface="Courier New" pitchFamily="49" charset="0"/>
+              </a:rPr>
+              <a:t>…</a:t>
+            </a:r>
+            <a:endParaRPr lang="en-US" sz="2000" dirty="0">
+              <a:latin typeface="Courier New" pitchFamily="49" charset="0"/>
+              <a:cs typeface="Courier New" pitchFamily="49" charset="0"/>
+            </a:endParaRPr>
+          </a:p>
+          <a:p>
+            <a:pPr marL="0" indent="0">
+              <a:buNone/>
+            </a:pPr>
             <a:endParaRPr lang="en-US" sz="2000" dirty="0"/>
           </a:p>
         </p:txBody>
@@ -10060,29 +10226,15 @@
               <a:buNone/>
             </a:pPr>
             <a:r>
-              <a:rPr lang="en-US" dirty="0">
-                <a:latin typeface="Courier New" pitchFamily="49" charset="0"/>
-                <a:cs typeface="Courier New" pitchFamily="49" charset="0"/>
-              </a:rPr>
-              <a:t>cache-control: no-cache, no-store, must-revalidate, pre-check=0, post-check=0</a:t>
-            </a:r>
-          </a:p>
-          <a:p>
-            <a:pPr marL="0" indent="0">
-              <a:buNone/>
-            </a:pPr>
-            <a:r>
               <a:rPr lang="en-US" dirty="0" smtClean="0">
-                <a:latin typeface="Courier New" pitchFamily="49" charset="0"/>
-                <a:cs typeface="Courier New" pitchFamily="49" charset="0"/>
-              </a:rPr>
-              <a:t>content-length: 103</a:t>
-            </a:r>
-          </a:p>
-          <a:p>
-            <a:pPr marL="0" indent="0">
-              <a:buNone/>
-            </a:pPr>
+                <a:solidFill>
+                  <a:srgbClr val="FF0000"/>
+                </a:solidFill>
+                <a:latin typeface="Courier New" pitchFamily="49" charset="0"/>
+                <a:cs typeface="Courier New" pitchFamily="49" charset="0"/>
+              </a:rPr>
+              <a:t>location</a:t>
+            </a:r>
             <a:r>
               <a:rPr lang="en-US" dirty="0">
                 <a:solidFill>
@@ -10091,7 +10243,7 @@
                 <a:latin typeface="Courier New" pitchFamily="49" charset="0"/>
                 <a:cs typeface="Courier New" pitchFamily="49" charset="0"/>
               </a:rPr>
-              <a:t>location: https://twitter.com/account/suspended</a:t>
+              <a:t>: https://twitter.com/account/suspended</a:t>
             </a:r>
           </a:p>
           <a:p>
@@ -10118,6 +10270,72 @@
                 <a:cs typeface="Courier New" pitchFamily="49" charset="0"/>
               </a:rPr>
               <a:t>….</a:t>
+            </a:r>
+          </a:p>
+          <a:p>
+            <a:pPr marL="0" indent="0">
+              <a:buNone/>
+            </a:pPr>
+            <a:endParaRPr lang="en-US" dirty="0" smtClean="0">
+              <a:latin typeface="Courier New" pitchFamily="49" charset="0"/>
+              <a:cs typeface="Courier New" pitchFamily="49" charset="0"/>
+            </a:endParaRPr>
+          </a:p>
+          <a:p>
+            <a:pPr marL="0" indent="0">
+              <a:buNone/>
+            </a:pPr>
+            <a:r>
+              <a:rPr lang="en-US" dirty="0">
+                <a:latin typeface="Courier New" pitchFamily="49" charset="0"/>
+                <a:cs typeface="Courier New" pitchFamily="49" charset="0"/>
+              </a:rPr>
+              <a:t>HTTP/1.1 200 OK</a:t>
+            </a:r>
+          </a:p>
+          <a:p>
+            <a:pPr marL="0" indent="0">
+              <a:buNone/>
+            </a:pPr>
+            <a:r>
+              <a:rPr lang="en-US" dirty="0" smtClean="0">
+                <a:latin typeface="Courier New" pitchFamily="49" charset="0"/>
+                <a:cs typeface="Courier New" pitchFamily="49" charset="0"/>
+              </a:rPr>
+              <a:t>content-length</a:t>
+            </a:r>
+            <a:r>
+              <a:rPr lang="en-US" dirty="0">
+                <a:latin typeface="Courier New" pitchFamily="49" charset="0"/>
+                <a:cs typeface="Courier New" pitchFamily="49" charset="0"/>
+              </a:rPr>
+              <a:t>: 282425</a:t>
+            </a:r>
+          </a:p>
+          <a:p>
+            <a:pPr marL="0" indent="0">
+              <a:buNone/>
+            </a:pPr>
+            <a:r>
+              <a:rPr lang="en-US" dirty="0" smtClean="0">
+                <a:latin typeface="Courier New" pitchFamily="49" charset="0"/>
+                <a:cs typeface="Courier New" pitchFamily="49" charset="0"/>
+              </a:rPr>
+              <a:t>…</a:t>
+            </a:r>
+            <a:r>
+              <a:rPr lang="en-US" dirty="0" err="1" smtClean="0">
+                <a:latin typeface="Courier New" pitchFamily="49" charset="0"/>
+                <a:cs typeface="Courier New" pitchFamily="49" charset="0"/>
+              </a:rPr>
+              <a:t>Deletia</a:t>
+            </a:r>
+            <a:r>
+              <a:rPr lang="en-US" dirty="0" smtClean="0">
+                <a:latin typeface="Courier New" pitchFamily="49" charset="0"/>
+                <a:cs typeface="Courier New" pitchFamily="49" charset="0"/>
+              </a:rPr>
+              <a:t>…</a:t>
             </a:r>
           </a:p>
           <a:p>
@@ -10178,37 +10396,14 @@
               <a:buNone/>
             </a:pPr>
             <a:r>
-              <a:rPr lang="en-US" dirty="0">
-                <a:latin typeface="Courier New" pitchFamily="49" charset="0"/>
-                <a:cs typeface="Courier New" pitchFamily="49" charset="0"/>
-              </a:rPr>
-              <a:t>cache-control: no-cache, no-store, must-revalidate, pre-check=0, post-check=0</a:t>
-            </a:r>
-          </a:p>
-          <a:p>
-            <a:pPr marL="0" indent="0">
-              <a:buNone/>
-            </a:pPr>
-            <a:r>
-              <a:rPr lang="en-US" dirty="0">
-                <a:latin typeface="Courier New" pitchFamily="49" charset="0"/>
-                <a:cs typeface="Courier New" pitchFamily="49" charset="0"/>
-              </a:rPr>
-              <a:t>content-length: </a:t>
-            </a:r>
-            <a:r>
               <a:rPr lang="en-US" dirty="0" smtClean="0">
-                <a:latin typeface="Courier New" pitchFamily="49" charset="0"/>
-                <a:cs typeface="Courier New" pitchFamily="49" charset="0"/>
-              </a:rPr>
-              <a:t>103location</a:t>
-            </a:r>
-            <a:r>
-              <a:rPr lang="en-US" dirty="0">
-                <a:latin typeface="Courier New" pitchFamily="49" charset="0"/>
-                <a:cs typeface="Courier New" pitchFamily="49" charset="0"/>
-              </a:rPr>
-              <a:t>: </a:t>
+                <a:solidFill>
+                  <a:srgbClr val="FF0000"/>
+                </a:solidFill>
+                <a:latin typeface="Courier New" pitchFamily="49" charset="0"/>
+                <a:cs typeface="Courier New" pitchFamily="49" charset="0"/>
+              </a:rPr>
+              <a:t>location</a:t>
             </a:r>
             <a:r>
               <a:rPr lang="en-US" dirty="0">
@@ -10218,7 +10413,7 @@
                 <a:latin typeface="Courier New" pitchFamily="49" charset="0"/>
                 <a:cs typeface="Courier New" pitchFamily="49" charset="0"/>
               </a:rPr>
-              <a:t>https://</a:t>
+              <a:t>: https://</a:t>
             </a:r>
             <a:r>
               <a:rPr lang="en-US" dirty="0" smtClean="0">
@@ -10230,10 +10425,6 @@
               </a:rPr>
               <a:t>twitter.com/account/suspended</a:t>
             </a:r>
-            <a:endParaRPr lang="en-US" dirty="0" smtClean="0">
-              <a:latin typeface="Courier New" pitchFamily="49" charset="0"/>
-              <a:cs typeface="Courier New" pitchFamily="49" charset="0"/>
-            </a:endParaRPr>
           </a:p>
           <a:p>
             <a:pPr marL="0" indent="0">
@@ -10260,6 +10451,67 @@
               </a:rPr>
               <a:t>…</a:t>
             </a:r>
+          </a:p>
+          <a:p>
+            <a:pPr marL="0" indent="0">
+              <a:buNone/>
+            </a:pPr>
+            <a:endParaRPr lang="en-US" dirty="0" smtClean="0"/>
+          </a:p>
+          <a:p>
+            <a:pPr marL="0" indent="0">
+              <a:buNone/>
+            </a:pPr>
+            <a:r>
+              <a:rPr lang="en-US" dirty="0">
+                <a:latin typeface="Courier New" pitchFamily="49" charset="0"/>
+                <a:cs typeface="Courier New" pitchFamily="49" charset="0"/>
+              </a:rPr>
+              <a:t>HTTP/1.1 200 OK</a:t>
+            </a:r>
+          </a:p>
+          <a:p>
+            <a:pPr marL="0" indent="0">
+              <a:buNone/>
+            </a:pPr>
+            <a:r>
+              <a:rPr lang="en-US" dirty="0">
+                <a:latin typeface="Courier New" pitchFamily="49" charset="0"/>
+                <a:cs typeface="Courier New" pitchFamily="49" charset="0"/>
+              </a:rPr>
+              <a:t>content-length: 282425</a:t>
+            </a:r>
+          </a:p>
+          <a:p>
+            <a:pPr marL="0" indent="0">
+              <a:buNone/>
+            </a:pPr>
+            <a:r>
+              <a:rPr lang="en-US" dirty="0">
+                <a:latin typeface="Courier New" pitchFamily="49" charset="0"/>
+                <a:cs typeface="Courier New" pitchFamily="49" charset="0"/>
+              </a:rPr>
+              <a:t>…</a:t>
+            </a:r>
+            <a:r>
+              <a:rPr lang="en-US" dirty="0" err="1">
+                <a:latin typeface="Courier New" pitchFamily="49" charset="0"/>
+                <a:cs typeface="Courier New" pitchFamily="49" charset="0"/>
+              </a:rPr>
+              <a:t>Deletia</a:t>
+            </a:r>
+            <a:r>
+              <a:rPr lang="en-US" dirty="0">
+                <a:latin typeface="Courier New" pitchFamily="49" charset="0"/>
+                <a:cs typeface="Courier New" pitchFamily="49" charset="0"/>
+              </a:rPr>
+              <a:t>…</a:t>
+            </a:r>
+          </a:p>
+          <a:p>
+            <a:pPr marL="0" indent="0">
+              <a:buNone/>
+            </a:pPr>
             <a:endParaRPr lang="en-US" dirty="0"/>
           </a:p>
         </p:txBody>
@@ -11414,7 +11666,7 @@
         <p:spPr/>
         <p:txBody>
           <a:bodyPr>
-            <a:normAutofit fontScale="85000" lnSpcReduction="10000"/>
+            <a:normAutofit fontScale="85000" lnSpcReduction="20000"/>
           </a:bodyPr>
           <a:lstStyle/>
           <a:p>
@@ -11466,23 +11718,18 @@
               <a:buNone/>
             </a:pPr>
             <a:r>
+              <a:rPr lang="en-US" sz="2000" dirty="0" smtClean="0">
+                <a:latin typeface="Courier New" pitchFamily="49" charset="0"/>
+                <a:cs typeface="Courier New" pitchFamily="49" charset="0"/>
+              </a:rPr>
+              <a:t>content-length</a:t>
+            </a:r>
+            <a:r>
               <a:rPr lang="en-US" sz="2000" dirty="0">
                 <a:latin typeface="Courier New" pitchFamily="49" charset="0"/>
                 <a:cs typeface="Courier New" pitchFamily="49" charset="0"/>
               </a:rPr>
-              <a:t>cache-control: no-cache, no-store, must-revalidate, pre-check=0, post-check=0</a:t>
-            </a:r>
-          </a:p>
-          <a:p>
-            <a:pPr marL="0" indent="0">
-              <a:buNone/>
-            </a:pPr>
-            <a:r>
-              <a:rPr lang="en-US" sz="2000" dirty="0">
-                <a:latin typeface="Courier New" pitchFamily="49" charset="0"/>
-                <a:cs typeface="Courier New" pitchFamily="49" charset="0"/>
-              </a:rPr>
-              <a:t>content-length: </a:t>
+              <a:t>: </a:t>
             </a:r>
             <a:r>
               <a:rPr lang="en-US" sz="2000" dirty="0" smtClean="0">
@@ -11560,6 +11807,76 @@
                 <a:cs typeface="Courier New" pitchFamily="49" charset="0"/>
               </a:rPr>
               <a:t>….</a:t>
+            </a:r>
+          </a:p>
+          <a:p>
+            <a:pPr marL="0" indent="0">
+              <a:buNone/>
+            </a:pPr>
+            <a:endParaRPr lang="en-US" sz="2000" dirty="0">
+              <a:latin typeface="Courier New" pitchFamily="49" charset="0"/>
+              <a:cs typeface="Courier New" pitchFamily="49" charset="0"/>
+            </a:endParaRPr>
+          </a:p>
+          <a:p>
+            <a:pPr marL="0" indent="0">
+              <a:buNone/>
+            </a:pPr>
+            <a:r>
+              <a:rPr lang="en-US" sz="1800" dirty="0">
+                <a:latin typeface="Courier New" pitchFamily="49" charset="0"/>
+                <a:cs typeface="Courier New" pitchFamily="49" charset="0"/>
+              </a:rPr>
+              <a:t>HTTP/1.1 200 </a:t>
+            </a:r>
+            <a:r>
+              <a:rPr lang="en-US" sz="1800" dirty="0" smtClean="0">
+                <a:latin typeface="Courier New" pitchFamily="49" charset="0"/>
+                <a:cs typeface="Courier New" pitchFamily="49" charset="0"/>
+              </a:rPr>
+              <a:t>OK</a:t>
+            </a:r>
+            <a:endParaRPr lang="en-US" sz="1800" dirty="0">
+              <a:latin typeface="Courier New" pitchFamily="49" charset="0"/>
+              <a:cs typeface="Courier New" pitchFamily="49" charset="0"/>
+            </a:endParaRPr>
+          </a:p>
+          <a:p>
+            <a:pPr marL="0" indent="0">
+              <a:buNone/>
+            </a:pPr>
+            <a:r>
+              <a:rPr lang="en-US" sz="1800" dirty="0">
+                <a:latin typeface="Courier New" pitchFamily="49" charset="0"/>
+                <a:cs typeface="Courier New" pitchFamily="49" charset="0"/>
+              </a:rPr>
+              <a:t>content-length: 314326</a:t>
+            </a:r>
+          </a:p>
+          <a:p>
+            <a:pPr marL="0" indent="0">
+              <a:buNone/>
+            </a:pPr>
+            <a:r>
+              <a:rPr lang="en-US" sz="1800" dirty="0" smtClean="0">
+                <a:latin typeface="Courier New" pitchFamily="49" charset="0"/>
+                <a:cs typeface="Courier New" pitchFamily="49" charset="0"/>
+              </a:rPr>
+              <a:t>…</a:t>
+            </a:r>
+            <a:r>
+              <a:rPr lang="en-US" sz="1800" dirty="0" err="1">
+                <a:latin typeface="Courier New" pitchFamily="49" charset="0"/>
+                <a:cs typeface="Courier New" pitchFamily="49" charset="0"/>
+              </a:rPr>
+              <a:t>Deletia</a:t>
+            </a:r>
+            <a:r>
+              <a:rPr lang="en-US" sz="1800" dirty="0">
+                <a:latin typeface="Courier New" pitchFamily="49" charset="0"/>
+                <a:cs typeface="Courier New" pitchFamily="49" charset="0"/>
+              </a:rPr>
+              <a:t>…</a:t>
             </a:r>
           </a:p>
           <a:p>
@@ -12118,8 +12435,25 @@
                 <a:latin typeface="Courier New" pitchFamily="49" charset="0"/>
                 <a:cs typeface="Courier New" pitchFamily="49" charset="0"/>
               </a:rPr>
-              <a:t>https://twitter.com//abc7elex/status/904050245759270912</a:t>
-            </a:r>
+              <a:t>https://</a:t>
+            </a:r>
+            <a:r>
+              <a:rPr lang="en-US" b="1" dirty="0" smtClean="0">
+                <a:solidFill>
+                  <a:srgbClr val="FF0000"/>
+                </a:solidFill>
+                <a:latin typeface="Courier New" pitchFamily="49" charset="0"/>
+                <a:cs typeface="Courier New" pitchFamily="49" charset="0"/>
+              </a:rPr>
+              <a:t>twitter.com/abc7elex/status/904050245759270912</a:t>
+            </a:r>
+            <a:endParaRPr lang="en-US" b="1" dirty="0">
+              <a:solidFill>
+                <a:srgbClr val="FF0000"/>
+              </a:solidFill>
+              <a:latin typeface="Courier New" pitchFamily="49" charset="0"/>
+              <a:cs typeface="Courier New" pitchFamily="49" charset="0"/>
+            </a:endParaRPr>
           </a:p>
           <a:p>
             <a:pPr marL="0" indent="0">
@@ -13763,49 +14097,23 @@
               <a:rPr lang="en-US" dirty="0" smtClean="0"/>
               <a:t>Tweets returning status code of 404 are deleted.</a:t>
             </a:r>
+          </a:p>
+          <a:p>
             <a:endParaRPr lang="en-US" dirty="0" smtClean="0"/>
           </a:p>
           <a:p>
+            <a:r>
+              <a:rPr lang="en-US" dirty="0" smtClean="0"/>
+              <a:t>Tweet returning a redirect status code of 302 can be either a protected tweet or a tweet belonging to a suspended account.</a:t>
+            </a:r>
+          </a:p>
+          <a:p>
             <a:endParaRPr lang="en-US" dirty="0" smtClean="0"/>
           </a:p>
           <a:p>
             <a:r>
               <a:rPr lang="en-US" dirty="0" smtClean="0"/>
-              <a:t>Tweet </a:t>
-            </a:r>
-            <a:r>
-              <a:rPr lang="en-US" dirty="0" smtClean="0"/>
-              <a:t>returning</a:t>
-            </a:r>
-            <a:r>
-              <a:rPr lang="en-US" dirty="0" smtClean="0"/>
-              <a:t> a redirect status code</a:t>
-            </a:r>
-            <a:r>
-              <a:rPr lang="en-US" dirty="0" smtClean="0"/>
-              <a:t> of 302 can be either a protected tweet or a tweet belonging to a suspended account.</a:t>
-            </a:r>
-            <a:endParaRPr lang="en-US" dirty="0" smtClean="0"/>
-          </a:p>
-          <a:p>
-            <a:endParaRPr lang="en-US" dirty="0" smtClean="0"/>
-          </a:p>
-          <a:p>
-            <a:r>
-              <a:rPr lang="en-US" dirty="0" smtClean="0"/>
-              <a:t>Original tweet </a:t>
-            </a:r>
-            <a:r>
-              <a:rPr lang="en-US" dirty="0" smtClean="0"/>
-              <a:t>returning status code of 200 </a:t>
-            </a:r>
-            <a:r>
-              <a:rPr lang="en-US" dirty="0" smtClean="0"/>
-              <a:t>but </a:t>
-            </a:r>
-            <a:r>
-              <a:rPr lang="en-US" dirty="0" smtClean="0"/>
-              <a:t>the retweet returns a status code of  404 making it a </a:t>
+              <a:t>Original tweet returning status code of 200 but the retweet returns a status code of  404 making it a </a:t>
             </a:r>
             <a:r>
               <a:rPr lang="en-US" dirty="0" err="1" smtClean="0"/>

</xml_diff>